<commit_message>
Added some changes to data and the ppt
</commit_message>
<xml_diff>
--- a/Final.pptx
+++ b/Final.pptx
@@ -129,6 +129,10 @@
     </p:ext>
   </p:extLst>
 </p:presentation>
+</file>
+
+<file path=ppt/revisionInfo.xml><?xml version="1.0" encoding="utf-8"?>
+<p1510:revInfo xmlns:a="http://schemas.openxmlformats.org/drawingml/2006/main" xmlns:r="http://schemas.openxmlformats.org/officeDocument/2006/relationships" xmlns:p1510="http://schemas.microsoft.com/office/powerpoint/2015/10/main"/>
 </file>
 
 <file path=ppt/notesMasters/notesMaster1.xml><?xml version="1.0" encoding="utf-8"?>
@@ -5637,7 +5641,7 @@
         </p:blipFill>
         <p:spPr>
           <a:xfrm>
-            <a:off x="934542" y="2605648"/>
+            <a:off x="943256" y="3469248"/>
             <a:ext cx="2133898" cy="857370"/>
           </a:xfrm>
           <a:prstGeom prst="rect">
@@ -5667,7 +5671,7 @@
         </p:blipFill>
         <p:spPr>
           <a:xfrm>
-            <a:off x="576249" y="3702617"/>
+            <a:off x="709370" y="2630696"/>
             <a:ext cx="2601670" cy="648035"/>
           </a:xfrm>
           <a:prstGeom prst="rect">

</xml_diff>

<commit_message>
Minor change to the spelling of the menu options
</commit_message>
<xml_diff>
--- a/Final.pptx
+++ b/Final.pptx
@@ -5,26 +5,27 @@
     <p:sldMasterId id="2147483648" r:id="rId1"/>
   </p:sldMasterIdLst>
   <p:notesMasterIdLst>
-    <p:notesMasterId r:id="rId19"/>
+    <p:notesMasterId r:id="rId20"/>
   </p:notesMasterIdLst>
   <p:sldIdLst>
     <p:sldId id="268" r:id="rId2"/>
     <p:sldId id="270" r:id="rId3"/>
     <p:sldId id="271" r:id="rId4"/>
     <p:sldId id="275" r:id="rId5"/>
-    <p:sldId id="272" r:id="rId6"/>
-    <p:sldId id="273" r:id="rId7"/>
-    <p:sldId id="274" r:id="rId8"/>
-    <p:sldId id="261" r:id="rId9"/>
-    <p:sldId id="265" r:id="rId10"/>
-    <p:sldId id="266" r:id="rId11"/>
-    <p:sldId id="257" r:id="rId12"/>
-    <p:sldId id="263" r:id="rId13"/>
-    <p:sldId id="258" r:id="rId14"/>
-    <p:sldId id="264" r:id="rId15"/>
-    <p:sldId id="260" r:id="rId16"/>
-    <p:sldId id="262" r:id="rId17"/>
-    <p:sldId id="259" r:id="rId18"/>
+    <p:sldId id="276" r:id="rId6"/>
+    <p:sldId id="272" r:id="rId7"/>
+    <p:sldId id="273" r:id="rId8"/>
+    <p:sldId id="274" r:id="rId9"/>
+    <p:sldId id="261" r:id="rId10"/>
+    <p:sldId id="265" r:id="rId11"/>
+    <p:sldId id="266" r:id="rId12"/>
+    <p:sldId id="257" r:id="rId13"/>
+    <p:sldId id="263" r:id="rId14"/>
+    <p:sldId id="258" r:id="rId15"/>
+    <p:sldId id="264" r:id="rId16"/>
+    <p:sldId id="260" r:id="rId17"/>
+    <p:sldId id="262" r:id="rId18"/>
+    <p:sldId id="259" r:id="rId19"/>
   </p:sldIdLst>
   <p:sldSz cx="12192000" cy="6858000"/>
   <p:notesSz cx="6858000" cy="9144000"/>
@@ -3822,196 +3823,90 @@
             <a:pPr algn="ctr"/>
             <a:r>
               <a:rPr lang="en-US" dirty="0"/>
-              <a:t>Linear Interpolation Between 2 Points</a:t>
-            </a:r>
-          </a:p>
-        </p:txBody>
-      </p:sp>
-      <p:pic>
-        <p:nvPicPr>
-          <p:cNvPr id="5" name="Content Placeholder 4"/>
-          <p:cNvPicPr>
-            <a:picLocks noGrp="1" noChangeAspect="1"/>
-          </p:cNvPicPr>
+              <a:t>Linear Interpolation of Data Points</a:t>
+            </a:r>
+          </a:p>
+        </p:txBody>
+      </p:sp>
+      <p:sp>
+        <p:nvSpPr>
+          <p:cNvPr id="3" name="Content Placeholder 2"/>
+          <p:cNvSpPr>
+            <a:spLocks noGrp="1"/>
+          </p:cNvSpPr>
           <p:nvPr>
             <p:ph idx="1"/>
           </p:nvPr>
-        </p:nvPicPr>
-        <p:blipFill>
-          <a:blip r:embed="rId2">
-            <a:extLst>
-              <a:ext uri="{28A0092B-C50C-407E-A947-70E740481C1C}">
-                <a14:useLocalDpi xmlns:a14="http://schemas.microsoft.com/office/drawing/2010/main" val="0"/>
-              </a:ext>
-            </a:extLst>
-          </a:blip>
-          <a:stretch>
-            <a:fillRect/>
-          </a:stretch>
-        </p:blipFill>
-        <p:spPr>
-          <a:xfrm>
-            <a:off x="7492273" y="5357620"/>
-            <a:ext cx="2867425" cy="990738"/>
-          </a:xfrm>
-        </p:spPr>
-      </p:pic>
-      <p:sp>
-        <p:nvSpPr>
-          <p:cNvPr id="8" name="TextBox 7"/>
-          <p:cNvSpPr txBox="1"/>
-          <p:nvPr/>
-        </p:nvSpPr>
-        <p:spPr>
-          <a:xfrm>
-            <a:off x="709127" y="1690688"/>
-            <a:ext cx="4674636" cy="369332"/>
-          </a:xfrm>
-          <a:prstGeom prst="rect">
-            <a:avLst/>
-          </a:prstGeom>
-          <a:noFill/>
-        </p:spPr>
-        <p:txBody>
-          <a:bodyPr wrap="square" rtlCol="0">
-            <a:spAutoFit/>
-          </a:bodyPr>
-          <a:lstStyle/>
-          <a:p>
+        </p:nvSpPr>
+        <p:spPr/>
+        <p:txBody>
+          <a:bodyPr/>
+          <a:lstStyle/>
+          <a:p>
+            <a:r>
+              <a:rPr lang="en-US" dirty="0"/>
+              <a:t>Solid colors are nice, but lack detail.</a:t>
+            </a:r>
+          </a:p>
+          <a:p>
+            <a:pPr lvl="1"/>
+            <a:r>
+              <a:rPr lang="en-US" dirty="0"/>
+              <a:t>What is the temperature between the different points?</a:t>
+            </a:r>
+          </a:p>
+          <a:p>
+            <a:r>
+              <a:rPr lang="en-US" dirty="0"/>
+              <a:t>Solution: Interpolate data points between the measured locations.</a:t>
+            </a:r>
+          </a:p>
+          <a:p>
+            <a:pPr lvl="1"/>
+            <a:r>
+              <a:rPr lang="en-US" dirty="0"/>
+              <a:t>Linear interpolation.</a:t>
+            </a:r>
+          </a:p>
+          <a:p>
+            <a:pPr lvl="2"/>
+            <a:r>
+              <a:rPr lang="en-US" dirty="0"/>
+              <a:t>Y = </a:t>
+            </a:r>
+            <a:r>
+              <a:rPr lang="en-US" dirty="0" err="1"/>
+              <a:t>mX</a:t>
+            </a:r>
+            <a:r>
+              <a:rPr lang="en-US" dirty="0"/>
+              <a:t> + b	where	m = (y1 – y2)/(x1 – x2)</a:t>
+            </a:r>
+          </a:p>
+          <a:p>
+            <a:pPr lvl="1"/>
+            <a:r>
+              <a:rPr lang="en-US" dirty="0"/>
+              <a:t>Quadradic interpolation</a:t>
+            </a:r>
+          </a:p>
+          <a:p>
+            <a:pPr lvl="2"/>
+            <a:r>
+              <a:rPr lang="en-US" dirty="0"/>
+              <a:t>Y = a(x-h)^2 + c		where ‘h’ is the x offset and ‘a’ scales the rate</a:t>
+            </a:r>
+          </a:p>
+          <a:p>
+            <a:pPr lvl="2"/>
             <a:endParaRPr lang="en-US" dirty="0"/>
-          </a:p>
-        </p:txBody>
-      </p:sp>
-      <p:pic>
-        <p:nvPicPr>
-          <p:cNvPr id="10" name="Picture 9"/>
-          <p:cNvPicPr>
-            <a:picLocks noChangeAspect="1"/>
-          </p:cNvPicPr>
-          <p:nvPr/>
-        </p:nvPicPr>
-        <p:blipFill>
-          <a:blip r:embed="rId3">
-            <a:extLst>
-              <a:ext uri="{28A0092B-C50C-407E-A947-70E740481C1C}">
-                <a14:useLocalDpi xmlns:a14="http://schemas.microsoft.com/office/drawing/2010/main" val="0"/>
-              </a:ext>
-            </a:extLst>
-          </a:blip>
-          <a:stretch>
-            <a:fillRect/>
-          </a:stretch>
-        </p:blipFill>
-        <p:spPr>
-          <a:xfrm>
-            <a:off x="7402804" y="1882639"/>
-            <a:ext cx="3046362" cy="3033117"/>
-          </a:xfrm>
-          <a:prstGeom prst="rect">
-            <a:avLst/>
-          </a:prstGeom>
-        </p:spPr>
-      </p:pic>
-      <p:sp>
-        <p:nvSpPr>
-          <p:cNvPr id="11" name="TextBox 10"/>
-          <p:cNvSpPr txBox="1"/>
-          <p:nvPr/>
-        </p:nvSpPr>
-        <p:spPr>
-          <a:xfrm>
-            <a:off x="709127" y="1690688"/>
-            <a:ext cx="5971591" cy="2862322"/>
-          </a:xfrm>
-          <a:prstGeom prst="rect">
-            <a:avLst/>
-          </a:prstGeom>
-          <a:noFill/>
-        </p:spPr>
-        <p:txBody>
-          <a:bodyPr wrap="square" rtlCol="0">
-            <a:spAutoFit/>
-          </a:bodyPr>
-          <a:lstStyle/>
-          <a:p>
-            <a:r>
-              <a:rPr lang="en-US" dirty="0"/>
-              <a:t>RED = -RGB + 255</a:t>
-            </a:r>
-          </a:p>
-          <a:p>
-            <a:r>
-              <a:rPr lang="en-US" dirty="0"/>
-              <a:t>BLUE = RGB</a:t>
-            </a:r>
-          </a:p>
-          <a:p>
-            <a:endParaRPr lang="en-US" dirty="0"/>
-          </a:p>
-          <a:p>
-            <a:r>
-              <a:rPr lang="en-US" dirty="0"/>
-              <a:t>Color(true RGB) = (RED, 0, BLUE)</a:t>
-            </a:r>
-          </a:p>
-          <a:p>
-            <a:r>
-              <a:rPr lang="en-US" dirty="0"/>
-              <a:t>Pros:</a:t>
-            </a:r>
-          </a:p>
-          <a:p>
-            <a:pPr marL="285750" indent="-285750">
-              <a:buFont typeface="Arial" panose="020B0604020202020204" pitchFamily="34" charset="0"/>
-              <a:buChar char="•"/>
-            </a:pPr>
-            <a:r>
-              <a:rPr lang="en-US" dirty="0"/>
-              <a:t>Nice gradient between points</a:t>
-            </a:r>
-          </a:p>
-          <a:p>
-            <a:pPr marL="285750" indent="-285750">
-              <a:buFont typeface="Arial" panose="020B0604020202020204" pitchFamily="34" charset="0"/>
-              <a:buChar char="•"/>
-            </a:pPr>
-            <a:r>
-              <a:rPr lang="en-US" dirty="0"/>
-              <a:t>Covers “hot” and “cold” conditions</a:t>
-            </a:r>
-          </a:p>
-          <a:p>
-            <a:r>
-              <a:rPr lang="en-US" dirty="0"/>
-              <a:t>Cons:</a:t>
-            </a:r>
-          </a:p>
-          <a:p>
-            <a:pPr marL="285750" indent="-285750">
-              <a:buFont typeface="Arial" panose="020B0604020202020204" pitchFamily="34" charset="0"/>
-              <a:buChar char="•"/>
-            </a:pPr>
-            <a:r>
-              <a:rPr lang="en-US" dirty="0"/>
-              <a:t>Lacks color</a:t>
-            </a:r>
-          </a:p>
-          <a:p>
-            <a:pPr marL="742950" lvl="1" indent="-285750">
-              <a:buFont typeface="Arial" panose="020B0604020202020204" pitchFamily="34" charset="0"/>
-              <a:buChar char="•"/>
-            </a:pPr>
-            <a:r>
-              <a:rPr lang="en-US" dirty="0"/>
-              <a:t>No one wants a 2 color heat map!</a:t>
-            </a:r>
           </a:p>
         </p:txBody>
       </p:sp>
     </p:spTree>
     <p:extLst>
       <p:ext uri="{BB962C8B-B14F-4D97-AF65-F5344CB8AC3E}">
-        <p14:creationId xmlns:p14="http://schemas.microsoft.com/office/powerpoint/2010/main" val="3625730890"/>
+        <p14:creationId xmlns:p14="http://schemas.microsoft.com/office/powerpoint/2010/main" val="2810286071"/>
       </p:ext>
     </p:extLst>
   </p:cSld>
@@ -4048,6 +3943,240 @@
             <p:ph type="title"/>
           </p:nvPr>
         </p:nvSpPr>
+        <p:spPr/>
+        <p:txBody>
+          <a:bodyPr/>
+          <a:lstStyle/>
+          <a:p>
+            <a:pPr algn="ctr"/>
+            <a:r>
+              <a:rPr lang="en-US" dirty="0"/>
+              <a:t>Linear Interpolation Between 2 Points</a:t>
+            </a:r>
+          </a:p>
+        </p:txBody>
+      </p:sp>
+      <p:pic>
+        <p:nvPicPr>
+          <p:cNvPr id="5" name="Content Placeholder 4"/>
+          <p:cNvPicPr>
+            <a:picLocks noGrp="1" noChangeAspect="1"/>
+          </p:cNvPicPr>
+          <p:nvPr>
+            <p:ph idx="1"/>
+          </p:nvPr>
+        </p:nvPicPr>
+        <p:blipFill>
+          <a:blip r:embed="rId2">
+            <a:extLst>
+              <a:ext uri="{28A0092B-C50C-407E-A947-70E740481C1C}">
+                <a14:useLocalDpi xmlns:a14="http://schemas.microsoft.com/office/drawing/2010/main" val="0"/>
+              </a:ext>
+            </a:extLst>
+          </a:blip>
+          <a:stretch>
+            <a:fillRect/>
+          </a:stretch>
+        </p:blipFill>
+        <p:spPr>
+          <a:xfrm>
+            <a:off x="7492273" y="5357620"/>
+            <a:ext cx="2867425" cy="990738"/>
+          </a:xfrm>
+        </p:spPr>
+      </p:pic>
+      <p:sp>
+        <p:nvSpPr>
+          <p:cNvPr id="8" name="TextBox 7"/>
+          <p:cNvSpPr txBox="1"/>
+          <p:nvPr/>
+        </p:nvSpPr>
+        <p:spPr>
+          <a:xfrm>
+            <a:off x="709127" y="1690688"/>
+            <a:ext cx="4674636" cy="369332"/>
+          </a:xfrm>
+          <a:prstGeom prst="rect">
+            <a:avLst/>
+          </a:prstGeom>
+          <a:noFill/>
+        </p:spPr>
+        <p:txBody>
+          <a:bodyPr wrap="square" rtlCol="0">
+            <a:spAutoFit/>
+          </a:bodyPr>
+          <a:lstStyle/>
+          <a:p>
+            <a:endParaRPr lang="en-US" dirty="0"/>
+          </a:p>
+        </p:txBody>
+      </p:sp>
+      <p:pic>
+        <p:nvPicPr>
+          <p:cNvPr id="10" name="Picture 9"/>
+          <p:cNvPicPr>
+            <a:picLocks noChangeAspect="1"/>
+          </p:cNvPicPr>
+          <p:nvPr/>
+        </p:nvPicPr>
+        <p:blipFill>
+          <a:blip r:embed="rId3">
+            <a:extLst>
+              <a:ext uri="{28A0092B-C50C-407E-A947-70E740481C1C}">
+                <a14:useLocalDpi xmlns:a14="http://schemas.microsoft.com/office/drawing/2010/main" val="0"/>
+              </a:ext>
+            </a:extLst>
+          </a:blip>
+          <a:stretch>
+            <a:fillRect/>
+          </a:stretch>
+        </p:blipFill>
+        <p:spPr>
+          <a:xfrm>
+            <a:off x="7402804" y="1882639"/>
+            <a:ext cx="3046362" cy="3033117"/>
+          </a:xfrm>
+          <a:prstGeom prst="rect">
+            <a:avLst/>
+          </a:prstGeom>
+        </p:spPr>
+      </p:pic>
+      <p:sp>
+        <p:nvSpPr>
+          <p:cNvPr id="11" name="TextBox 10"/>
+          <p:cNvSpPr txBox="1"/>
+          <p:nvPr/>
+        </p:nvSpPr>
+        <p:spPr>
+          <a:xfrm>
+            <a:off x="709127" y="1690688"/>
+            <a:ext cx="5971591" cy="2862322"/>
+          </a:xfrm>
+          <a:prstGeom prst="rect">
+            <a:avLst/>
+          </a:prstGeom>
+          <a:noFill/>
+        </p:spPr>
+        <p:txBody>
+          <a:bodyPr wrap="square" rtlCol="0">
+            <a:spAutoFit/>
+          </a:bodyPr>
+          <a:lstStyle/>
+          <a:p>
+            <a:r>
+              <a:rPr lang="en-US" dirty="0"/>
+              <a:t>RED = -RGB + 255</a:t>
+            </a:r>
+          </a:p>
+          <a:p>
+            <a:r>
+              <a:rPr lang="en-US" dirty="0"/>
+              <a:t>BLUE = RGB</a:t>
+            </a:r>
+          </a:p>
+          <a:p>
+            <a:endParaRPr lang="en-US" dirty="0"/>
+          </a:p>
+          <a:p>
+            <a:r>
+              <a:rPr lang="en-US" dirty="0"/>
+              <a:t>Color(true RGB) = (RED, 0, BLUE)</a:t>
+            </a:r>
+          </a:p>
+          <a:p>
+            <a:r>
+              <a:rPr lang="en-US" dirty="0"/>
+              <a:t>Pros:</a:t>
+            </a:r>
+          </a:p>
+          <a:p>
+            <a:pPr marL="285750" indent="-285750">
+              <a:buFont typeface="Arial" panose="020B0604020202020204" pitchFamily="34" charset="0"/>
+              <a:buChar char="•"/>
+            </a:pPr>
+            <a:r>
+              <a:rPr lang="en-US" dirty="0"/>
+              <a:t>Nice gradient between points</a:t>
+            </a:r>
+          </a:p>
+          <a:p>
+            <a:pPr marL="285750" indent="-285750">
+              <a:buFont typeface="Arial" panose="020B0604020202020204" pitchFamily="34" charset="0"/>
+              <a:buChar char="•"/>
+            </a:pPr>
+            <a:r>
+              <a:rPr lang="en-US" dirty="0"/>
+              <a:t>Covers “hot” and “cold” conditions</a:t>
+            </a:r>
+          </a:p>
+          <a:p>
+            <a:r>
+              <a:rPr lang="en-US" dirty="0"/>
+              <a:t>Cons:</a:t>
+            </a:r>
+          </a:p>
+          <a:p>
+            <a:pPr marL="285750" indent="-285750">
+              <a:buFont typeface="Arial" panose="020B0604020202020204" pitchFamily="34" charset="0"/>
+              <a:buChar char="•"/>
+            </a:pPr>
+            <a:r>
+              <a:rPr lang="en-US" dirty="0"/>
+              <a:t>Lacks color</a:t>
+            </a:r>
+          </a:p>
+          <a:p>
+            <a:pPr marL="742950" lvl="1" indent="-285750">
+              <a:buFont typeface="Arial" panose="020B0604020202020204" pitchFamily="34" charset="0"/>
+              <a:buChar char="•"/>
+            </a:pPr>
+            <a:r>
+              <a:rPr lang="en-US" dirty="0"/>
+              <a:t>No one wants a 2 color heat map!</a:t>
+            </a:r>
+          </a:p>
+        </p:txBody>
+      </p:sp>
+    </p:spTree>
+    <p:extLst>
+      <p:ext uri="{BB962C8B-B14F-4D97-AF65-F5344CB8AC3E}">
+        <p14:creationId xmlns:p14="http://schemas.microsoft.com/office/powerpoint/2010/main" val="3625730890"/>
+      </p:ext>
+    </p:extLst>
+  </p:cSld>
+  <p:clrMapOvr>
+    <a:masterClrMapping/>
+  </p:clrMapOvr>
+</p:sld>
+</file>
+
+<file path=ppt/slides/slide12.xml><?xml version="1.0" encoding="utf-8"?>
+<p:sld xmlns:a="http://schemas.openxmlformats.org/drawingml/2006/main" xmlns:r="http://schemas.openxmlformats.org/officeDocument/2006/relationships" xmlns:p="http://schemas.openxmlformats.org/presentationml/2006/main">
+  <p:cSld>
+    <p:spTree>
+      <p:nvGrpSpPr>
+        <p:cNvPr id="1" name=""/>
+        <p:cNvGrpSpPr/>
+        <p:nvPr/>
+      </p:nvGrpSpPr>
+      <p:grpSpPr>
+        <a:xfrm>
+          <a:off x="0" y="0"/>
+          <a:ext cx="0" cy="0"/>
+          <a:chOff x="0" y="0"/>
+          <a:chExt cx="0" cy="0"/>
+        </a:xfrm>
+      </p:grpSpPr>
+      <p:sp>
+        <p:nvSpPr>
+          <p:cNvPr id="2" name="Title 1"/>
+          <p:cNvSpPr>
+            <a:spLocks noGrp="1"/>
+          </p:cNvSpPr>
+          <p:nvPr>
+            <p:ph type="title"/>
+          </p:nvPr>
+        </p:nvSpPr>
         <p:spPr>
           <a:xfrm>
             <a:off x="838200" y="365125"/>
@@ -4240,7 +4369,7 @@
 </p:sld>
 </file>
 
-<file path=ppt/slides/slide12.xml><?xml version="1.0" encoding="utf-8"?>
+<file path=ppt/slides/slide13.xml><?xml version="1.0" encoding="utf-8"?>
 <p:sld xmlns:a="http://schemas.openxmlformats.org/drawingml/2006/main" xmlns:r="http://schemas.openxmlformats.org/officeDocument/2006/relationships" xmlns:p="http://schemas.openxmlformats.org/presentationml/2006/main">
   <p:cSld>
     <p:spTree>
@@ -4493,88 +4622,6 @@
 </p:sld>
 </file>
 
-<file path=ppt/slides/slide13.xml><?xml version="1.0" encoding="utf-8"?>
-<p:sld xmlns:a="http://schemas.openxmlformats.org/drawingml/2006/main" xmlns:r="http://schemas.openxmlformats.org/officeDocument/2006/relationships" xmlns:p="http://schemas.openxmlformats.org/presentationml/2006/main">
-  <p:cSld>
-    <p:spTree>
-      <p:nvGrpSpPr>
-        <p:cNvPr id="1" name=""/>
-        <p:cNvGrpSpPr/>
-        <p:nvPr/>
-      </p:nvGrpSpPr>
-      <p:grpSpPr>
-        <a:xfrm>
-          <a:off x="0" y="0"/>
-          <a:ext cx="0" cy="0"/>
-          <a:chOff x="0" y="0"/>
-          <a:chExt cx="0" cy="0"/>
-        </a:xfrm>
-      </p:grpSpPr>
-      <p:sp>
-        <p:nvSpPr>
-          <p:cNvPr id="2" name="Title 1"/>
-          <p:cNvSpPr>
-            <a:spLocks noGrp="1"/>
-          </p:cNvSpPr>
-          <p:nvPr>
-            <p:ph type="title"/>
-          </p:nvPr>
-        </p:nvSpPr>
-        <p:spPr/>
-        <p:txBody>
-          <a:bodyPr/>
-          <a:lstStyle/>
-          <a:p>
-            <a:pPr algn="ctr"/>
-            <a:r>
-              <a:rPr lang="en-US" dirty="0"/>
-              <a:t>510 Quadratic RGB Interpolation</a:t>
-            </a:r>
-          </a:p>
-        </p:txBody>
-      </p:sp>
-      <p:pic>
-        <p:nvPicPr>
-          <p:cNvPr id="4" name="Content Placeholder 3"/>
-          <p:cNvPicPr>
-            <a:picLocks noGrp="1" noChangeAspect="1"/>
-          </p:cNvPicPr>
-          <p:nvPr>
-            <p:ph idx="1"/>
-          </p:nvPr>
-        </p:nvPicPr>
-        <p:blipFill>
-          <a:blip r:embed="rId2">
-            <a:extLst>
-              <a:ext uri="{28A0092B-C50C-407E-A947-70E740481C1C}">
-                <a14:useLocalDpi xmlns:a14="http://schemas.microsoft.com/office/drawing/2010/main" val="0"/>
-              </a:ext>
-            </a:extLst>
-          </a:blip>
-          <a:stretch>
-            <a:fillRect/>
-          </a:stretch>
-        </p:blipFill>
-        <p:spPr>
-          <a:xfrm>
-            <a:off x="2837995" y="1690688"/>
-            <a:ext cx="6516009" cy="3410426"/>
-          </a:xfrm>
-        </p:spPr>
-      </p:pic>
-    </p:spTree>
-    <p:extLst>
-      <p:ext uri="{BB962C8B-B14F-4D97-AF65-F5344CB8AC3E}">
-        <p14:creationId xmlns:p14="http://schemas.microsoft.com/office/powerpoint/2010/main" val="2120599663"/>
-      </p:ext>
-    </p:extLst>
-  </p:cSld>
-  <p:clrMapOvr>
-    <a:masterClrMapping/>
-  </p:clrMapOvr>
-</p:sld>
-</file>
-
 <file path=ppt/slides/slide14.xml><?xml version="1.0" encoding="utf-8"?>
 <p:sld xmlns:a="http://schemas.openxmlformats.org/drawingml/2006/main" xmlns:r="http://schemas.openxmlformats.org/officeDocument/2006/relationships" xmlns:p="http://schemas.openxmlformats.org/presentationml/2006/main">
   <p:cSld>
@@ -4610,71 +4657,44 @@
             <a:pPr algn="ctr"/>
             <a:r>
               <a:rPr lang="en-US" dirty="0"/>
-              <a:t>RGB Gradient Given 3 Celsius Values</a:t>
-            </a:r>
-          </a:p>
-        </p:txBody>
-      </p:sp>
-      <p:sp>
-        <p:nvSpPr>
-          <p:cNvPr id="3" name="Content Placeholder 2"/>
-          <p:cNvSpPr>
-            <a:spLocks noGrp="1"/>
-          </p:cNvSpPr>
+              <a:t>510 Quadratic RGB Interpolation</a:t>
+            </a:r>
+          </a:p>
+        </p:txBody>
+      </p:sp>
+      <p:pic>
+        <p:nvPicPr>
+          <p:cNvPr id="4" name="Content Placeholder 3"/>
+          <p:cNvPicPr>
+            <a:picLocks noGrp="1" noChangeAspect="1"/>
+          </p:cNvPicPr>
           <p:nvPr>
             <p:ph idx="1"/>
           </p:nvPr>
-        </p:nvSpPr>
-        <p:spPr/>
-        <p:txBody>
-          <a:bodyPr/>
-          <a:lstStyle/>
-          <a:p>
-            <a:r>
-              <a:rPr lang="en-US" dirty="0"/>
-              <a:t>Problems</a:t>
-            </a:r>
-          </a:p>
-          <a:p>
-            <a:pPr lvl="1"/>
-            <a:r>
-              <a:rPr lang="en-US" dirty="0"/>
-              <a:t> 510 gradient assumes constant gradient between all 3 points.</a:t>
-            </a:r>
-          </a:p>
-          <a:p>
-            <a:pPr lvl="2"/>
-            <a:r>
-              <a:rPr lang="en-US" dirty="0"/>
-              <a:t>3 Celsius values are (assumed to be) random at any point in time. Therefore the slope between any two points is also random.</a:t>
-            </a:r>
-          </a:p>
-          <a:p>
-            <a:pPr lvl="1"/>
-            <a:r>
-              <a:rPr lang="en-US" dirty="0"/>
-              <a:t>Conversion between Celsius and RGB</a:t>
-            </a:r>
-          </a:p>
-          <a:p>
-            <a:pPr lvl="2"/>
-            <a:r>
-              <a:rPr lang="en-US" dirty="0"/>
-              <a:t>Converting from RGB to “true” RGB from graphs and equations</a:t>
-            </a:r>
-          </a:p>
-          <a:p>
-            <a:pPr marL="0" indent="0">
-              <a:buNone/>
-            </a:pPr>
-            <a:endParaRPr lang="en-US" dirty="0"/>
-          </a:p>
-        </p:txBody>
-      </p:sp>
+        </p:nvPicPr>
+        <p:blipFill>
+          <a:blip r:embed="rId2">
+            <a:extLst>
+              <a:ext uri="{28A0092B-C50C-407E-A947-70E740481C1C}">
+                <a14:useLocalDpi xmlns:a14="http://schemas.microsoft.com/office/drawing/2010/main" val="0"/>
+              </a:ext>
+            </a:extLst>
+          </a:blip>
+          <a:stretch>
+            <a:fillRect/>
+          </a:stretch>
+        </p:blipFill>
+        <p:spPr>
+          <a:xfrm>
+            <a:off x="2837995" y="1690688"/>
+            <a:ext cx="6516009" cy="3410426"/>
+          </a:xfrm>
+        </p:spPr>
+      </p:pic>
     </p:spTree>
     <p:extLst>
       <p:ext uri="{BB962C8B-B14F-4D97-AF65-F5344CB8AC3E}">
-        <p14:creationId xmlns:p14="http://schemas.microsoft.com/office/powerpoint/2010/main" val="4193747219"/>
+        <p14:creationId xmlns:p14="http://schemas.microsoft.com/office/powerpoint/2010/main" val="2120599663"/>
       </p:ext>
     </p:extLst>
   </p:cSld>
@@ -4719,7 +4739,7 @@
             <a:pPr algn="ctr"/>
             <a:r>
               <a:rPr lang="en-US" dirty="0"/>
-              <a:t>Celsius to RGB Conversion</a:t>
+              <a:t>RGB Gradient Given 3 Celsius Values</a:t>
             </a:r>
           </a:p>
         </p:txBody>
@@ -4739,86 +4759,51 @@
           <a:bodyPr/>
           <a:lstStyle/>
           <a:p>
-            <a:pPr marL="457200" lvl="1" indent="0">
+            <a:r>
+              <a:rPr lang="en-US" dirty="0"/>
+              <a:t>Problems</a:t>
+            </a:r>
+          </a:p>
+          <a:p>
+            <a:pPr lvl="1"/>
+            <a:r>
+              <a:rPr lang="en-US" dirty="0"/>
+              <a:t> 510 gradient assumes constant gradient between all 3 points.</a:t>
+            </a:r>
+          </a:p>
+          <a:p>
+            <a:pPr lvl="2"/>
+            <a:r>
+              <a:rPr lang="en-US" dirty="0"/>
+              <a:t>3 Celsius values are (assumed to be) random at any point in time. Therefore the slope between any two points is also random.</a:t>
+            </a:r>
+          </a:p>
+          <a:p>
+            <a:pPr lvl="1"/>
+            <a:r>
+              <a:rPr lang="en-US" dirty="0"/>
+              <a:t>Conversion between Celsius and RGB</a:t>
+            </a:r>
+          </a:p>
+          <a:p>
+            <a:pPr lvl="2"/>
+            <a:r>
+              <a:rPr lang="en-US" dirty="0"/>
+              <a:t>Converting from RGB to “true” RGB from graphs and equations</a:t>
+            </a:r>
+          </a:p>
+          <a:p>
+            <a:pPr marL="0" indent="0">
               <a:buNone/>
             </a:pPr>
             <a:endParaRPr lang="en-US" dirty="0"/>
           </a:p>
-          <a:p>
-            <a:pPr lvl="1"/>
-            <a:r>
-              <a:rPr lang="en-US" dirty="0"/>
-              <a:t>Assumptions:</a:t>
-            </a:r>
-          </a:p>
-          <a:p>
-            <a:pPr lvl="2"/>
-            <a:r>
-              <a:rPr lang="en-US" dirty="0"/>
-              <a:t>Max degree Celsius – 110</a:t>
-            </a:r>
-          </a:p>
-          <a:p>
-            <a:pPr lvl="2"/>
-            <a:r>
-              <a:rPr lang="en-US" dirty="0"/>
-              <a:t>Min degree Celsius – 0</a:t>
-            </a:r>
-          </a:p>
-          <a:p>
-            <a:pPr lvl="1"/>
-            <a:r>
-              <a:rPr lang="en-US" dirty="0"/>
-              <a:t>510 Linear RGB Interpolation</a:t>
-            </a:r>
-          </a:p>
-          <a:p>
-            <a:pPr lvl="2"/>
-            <a:r>
-              <a:rPr lang="en-US" dirty="0"/>
-              <a:t>RGB = (Scaling Factor)(Degree C)</a:t>
-            </a:r>
-          </a:p>
-          <a:p>
-            <a:pPr lvl="2"/>
-            <a:r>
-              <a:rPr lang="en-US" dirty="0"/>
-              <a:t>Scaling Factor is a ratio</a:t>
-            </a:r>
-          </a:p>
-          <a:p>
-            <a:pPr lvl="2"/>
-            <a:r>
-              <a:rPr lang="en-US" dirty="0"/>
-              <a:t>Scaling Factor = #RGB values / #Possible Degree C = 510 / 110</a:t>
-            </a:r>
-          </a:p>
-          <a:p>
-            <a:pPr lvl="2"/>
-            <a:endParaRPr lang="en-US" dirty="0"/>
-          </a:p>
-          <a:p>
-            <a:pPr lvl="2"/>
-            <a:endParaRPr lang="en-US" dirty="0"/>
-          </a:p>
-          <a:p>
-            <a:pPr lvl="1"/>
-            <a:endParaRPr lang="en-US" dirty="0"/>
-          </a:p>
-          <a:p>
-            <a:pPr lvl="1"/>
-            <a:endParaRPr lang="en-US" dirty="0"/>
-          </a:p>
-          <a:p>
-            <a:pPr lvl="1"/>
-            <a:endParaRPr lang="en-US" dirty="0"/>
-          </a:p>
         </p:txBody>
       </p:sp>
     </p:spTree>
     <p:extLst>
       <p:ext uri="{BB962C8B-B14F-4D97-AF65-F5344CB8AC3E}">
-        <p14:creationId xmlns:p14="http://schemas.microsoft.com/office/powerpoint/2010/main" val="4272314917"/>
+        <p14:creationId xmlns:p14="http://schemas.microsoft.com/office/powerpoint/2010/main" val="4193747219"/>
       </p:ext>
     </p:extLst>
   </p:cSld>
@@ -4868,6 +4853,150 @@
           </a:p>
         </p:txBody>
       </p:sp>
+      <p:sp>
+        <p:nvSpPr>
+          <p:cNvPr id="3" name="Content Placeholder 2"/>
+          <p:cNvSpPr>
+            <a:spLocks noGrp="1"/>
+          </p:cNvSpPr>
+          <p:nvPr>
+            <p:ph idx="1"/>
+          </p:nvPr>
+        </p:nvSpPr>
+        <p:spPr/>
+        <p:txBody>
+          <a:bodyPr/>
+          <a:lstStyle/>
+          <a:p>
+            <a:pPr marL="457200" lvl="1" indent="0">
+              <a:buNone/>
+            </a:pPr>
+            <a:endParaRPr lang="en-US" dirty="0"/>
+          </a:p>
+          <a:p>
+            <a:pPr lvl="1"/>
+            <a:r>
+              <a:rPr lang="en-US" dirty="0"/>
+              <a:t>Assumptions:</a:t>
+            </a:r>
+          </a:p>
+          <a:p>
+            <a:pPr lvl="2"/>
+            <a:r>
+              <a:rPr lang="en-US" dirty="0"/>
+              <a:t>Max degree Celsius – 110</a:t>
+            </a:r>
+          </a:p>
+          <a:p>
+            <a:pPr lvl="2"/>
+            <a:r>
+              <a:rPr lang="en-US" dirty="0"/>
+              <a:t>Min degree Celsius – 0</a:t>
+            </a:r>
+          </a:p>
+          <a:p>
+            <a:pPr lvl="1"/>
+            <a:r>
+              <a:rPr lang="en-US" dirty="0"/>
+              <a:t>510 Linear RGB Interpolation</a:t>
+            </a:r>
+          </a:p>
+          <a:p>
+            <a:pPr lvl="2"/>
+            <a:r>
+              <a:rPr lang="en-US" dirty="0"/>
+              <a:t>RGB = (Scaling Factor)(Degree C)</a:t>
+            </a:r>
+          </a:p>
+          <a:p>
+            <a:pPr lvl="2"/>
+            <a:r>
+              <a:rPr lang="en-US" dirty="0"/>
+              <a:t>Scaling Factor is a ratio</a:t>
+            </a:r>
+          </a:p>
+          <a:p>
+            <a:pPr lvl="2"/>
+            <a:r>
+              <a:rPr lang="en-US" dirty="0"/>
+              <a:t>Scaling Factor = #RGB values / #Possible Degree C = 510 / 110</a:t>
+            </a:r>
+          </a:p>
+          <a:p>
+            <a:pPr lvl="2"/>
+            <a:endParaRPr lang="en-US" dirty="0"/>
+          </a:p>
+          <a:p>
+            <a:pPr lvl="2"/>
+            <a:endParaRPr lang="en-US" dirty="0"/>
+          </a:p>
+          <a:p>
+            <a:pPr lvl="1"/>
+            <a:endParaRPr lang="en-US" dirty="0"/>
+          </a:p>
+          <a:p>
+            <a:pPr lvl="1"/>
+            <a:endParaRPr lang="en-US" dirty="0"/>
+          </a:p>
+          <a:p>
+            <a:pPr lvl="1"/>
+            <a:endParaRPr lang="en-US" dirty="0"/>
+          </a:p>
+        </p:txBody>
+      </p:sp>
+    </p:spTree>
+    <p:extLst>
+      <p:ext uri="{BB962C8B-B14F-4D97-AF65-F5344CB8AC3E}">
+        <p14:creationId xmlns:p14="http://schemas.microsoft.com/office/powerpoint/2010/main" val="4272314917"/>
+      </p:ext>
+    </p:extLst>
+  </p:cSld>
+  <p:clrMapOvr>
+    <a:masterClrMapping/>
+  </p:clrMapOvr>
+</p:sld>
+</file>
+
+<file path=ppt/slides/slide17.xml><?xml version="1.0" encoding="utf-8"?>
+<p:sld xmlns:a="http://schemas.openxmlformats.org/drawingml/2006/main" xmlns:r="http://schemas.openxmlformats.org/officeDocument/2006/relationships" xmlns:p="http://schemas.openxmlformats.org/presentationml/2006/main">
+  <p:cSld>
+    <p:spTree>
+      <p:nvGrpSpPr>
+        <p:cNvPr id="1" name=""/>
+        <p:cNvGrpSpPr/>
+        <p:nvPr/>
+      </p:nvGrpSpPr>
+      <p:grpSpPr>
+        <a:xfrm>
+          <a:off x="0" y="0"/>
+          <a:ext cx="0" cy="0"/>
+          <a:chOff x="0" y="0"/>
+          <a:chExt cx="0" cy="0"/>
+        </a:xfrm>
+      </p:grpSpPr>
+      <p:sp>
+        <p:nvSpPr>
+          <p:cNvPr id="2" name="Title 1"/>
+          <p:cNvSpPr>
+            <a:spLocks noGrp="1"/>
+          </p:cNvSpPr>
+          <p:nvPr>
+            <p:ph type="title"/>
+          </p:nvPr>
+        </p:nvSpPr>
+        <p:spPr/>
+        <p:txBody>
+          <a:bodyPr/>
+          <a:lstStyle/>
+          <a:p>
+            <a:pPr algn="ctr"/>
+            <a:r>
+              <a:rPr lang="en-US" dirty="0"/>
+              <a:t>Celsius to RGB Conversion</a:t>
+            </a:r>
+          </a:p>
+        </p:txBody>
+      </p:sp>
       <p:pic>
         <p:nvPicPr>
           <p:cNvPr id="4" name="Content Placeholder 3"/>
@@ -4969,7 +5098,7 @@
 </p:sld>
 </file>
 
-<file path=ppt/slides/slide17.xml><?xml version="1.0" encoding="utf-8"?>
+<file path=ppt/slides/slide18.xml><?xml version="1.0" encoding="utf-8"?>
 <p:sld xmlns:a="http://schemas.openxmlformats.org/drawingml/2006/main" xmlns:r="http://schemas.openxmlformats.org/officeDocument/2006/relationships" xmlns:p="http://schemas.openxmlformats.org/presentationml/2006/main">
   <p:cSld>
     <p:spTree>
@@ -5522,6 +5651,197 @@
 </file>
 
 <file path=ppt/slides/slide5.xml><?xml version="1.0" encoding="utf-8"?>
+<p:sld xmlns:a="http://schemas.openxmlformats.org/drawingml/2006/main" xmlns:r="http://schemas.openxmlformats.org/officeDocument/2006/relationships" xmlns:p="http://schemas.openxmlformats.org/presentationml/2006/main">
+  <p:cSld>
+    <p:spTree>
+      <p:nvGrpSpPr>
+        <p:cNvPr id="1" name=""/>
+        <p:cNvGrpSpPr/>
+        <p:nvPr/>
+      </p:nvGrpSpPr>
+      <p:grpSpPr>
+        <a:xfrm>
+          <a:off x="0" y="0"/>
+          <a:ext cx="0" cy="0"/>
+          <a:chOff x="0" y="0"/>
+          <a:chExt cx="0" cy="0"/>
+        </a:xfrm>
+      </p:grpSpPr>
+      <p:sp>
+        <p:nvSpPr>
+          <p:cNvPr id="10" name="Rectangle 9"/>
+          <p:cNvSpPr>
+            <a:spLocks noGrp="1" noRot="1" noChangeAspect="1" noMove="1" noResize="1" noEditPoints="1" noAdjustHandles="1" noChangeArrowheads="1" noChangeShapeType="1" noTextEdit="1"/>
+          </p:cNvSpPr>
+          <p:nvPr>
+            <p:extLst>
+              <p:ext uri="{386F3935-93C4-4BCD-93E2-E3B085C9AB24}">
+                <p16:designElem xmlns:p16="http://schemas.microsoft.com/office/powerpoint/2015/main" val="1"/>
+              </p:ext>
+            </p:extLst>
+          </p:nvPr>
+        </p:nvSpPr>
+        <p:spPr bwMode="white">
+          <a:xfrm>
+            <a:off x="0" y="0"/>
+            <a:ext cx="12192000" cy="6858000"/>
+          </a:xfrm>
+          <a:prstGeom prst="rect">
+            <a:avLst/>
+          </a:prstGeom>
+          <a:solidFill>
+            <a:schemeClr val="bg1"/>
+          </a:solidFill>
+          <a:ln>
+            <a:noFill/>
+          </a:ln>
+          <a:effectLst/>
+        </p:spPr>
+      </p:sp>
+      <p:pic>
+        <p:nvPicPr>
+          <p:cNvPr id="5" name="Content Placeholder 4"/>
+          <p:cNvPicPr>
+            <a:picLocks noGrp="1" noChangeAspect="1"/>
+          </p:cNvPicPr>
+          <p:nvPr>
+            <p:ph idx="1"/>
+          </p:nvPr>
+        </p:nvPicPr>
+        <p:blipFill>
+          <a:blip r:embed="rId2">
+            <a:extLst>
+              <a:ext uri="{28A0092B-C50C-407E-A947-70E740481C1C}">
+                <a14:useLocalDpi xmlns:a14="http://schemas.microsoft.com/office/drawing/2010/main" val="0"/>
+              </a:ext>
+            </a:extLst>
+          </a:blip>
+          <a:stretch>
+            <a:fillRect/>
+          </a:stretch>
+        </p:blipFill>
+        <p:spPr>
+          <a:xfrm>
+            <a:off x="3657600" y="-858696"/>
+            <a:ext cx="8517207" cy="8941950"/>
+          </a:xfrm>
+          <a:prstGeom prst="rect">
+            <a:avLst/>
+          </a:prstGeom>
+        </p:spPr>
+      </p:pic>
+      <p:sp>
+        <p:nvSpPr>
+          <p:cNvPr id="12" name="Down Arrow 7"/>
+          <p:cNvSpPr>
+            <a:spLocks noGrp="1" noRot="1" noChangeAspect="1" noMove="1" noResize="1" noEditPoints="1" noAdjustHandles="1" noChangeArrowheads="1" noChangeShapeType="1" noTextEdit="1"/>
+          </p:cNvSpPr>
+          <p:nvPr>
+            <p:extLst>
+              <p:ext uri="{386F3935-93C4-4BCD-93E2-E3B085C9AB24}">
+                <p16:designElem xmlns:p16="http://schemas.microsoft.com/office/powerpoint/2015/main" val="1"/>
+              </p:ext>
+            </p:extLst>
+          </p:nvPr>
+        </p:nvSpPr>
+        <p:spPr>
+          <a:xfrm rot="16200000">
+            <a:off x="800100" y="1491343"/>
+            <a:ext cx="3333749" cy="3499103"/>
+          </a:xfrm>
+          <a:prstGeom prst="downArrow">
+            <a:avLst>
+              <a:gd name="adj1" fmla="val 100000"/>
+              <a:gd name="adj2" fmla="val 15788"/>
+            </a:avLst>
+          </a:prstGeom>
+          <a:solidFill>
+            <a:schemeClr val="tx1">
+              <a:lumMod val="85000"/>
+              <a:lumOff val="15000"/>
+            </a:schemeClr>
+          </a:solidFill>
+          <a:ln w="53975">
+            <a:noFill/>
+          </a:ln>
+        </p:spPr>
+        <p:style>
+          <a:lnRef idx="2">
+            <a:schemeClr val="accent1">
+              <a:shade val="50000"/>
+            </a:schemeClr>
+          </a:lnRef>
+          <a:fillRef idx="1">
+            <a:schemeClr val="accent1"/>
+          </a:fillRef>
+          <a:effectRef idx="0">
+            <a:schemeClr val="accent1"/>
+          </a:effectRef>
+          <a:fontRef idx="minor">
+            <a:schemeClr val="lt1"/>
+          </a:fontRef>
+        </p:style>
+        <p:txBody>
+          <a:bodyPr rtlCol="0" anchor="ctr"/>
+          <a:lstStyle/>
+          <a:p>
+            <a:pPr algn="ctr"/>
+            <a:endParaRPr lang="en-US"/>
+          </a:p>
+        </p:txBody>
+      </p:sp>
+      <p:sp>
+        <p:nvSpPr>
+          <p:cNvPr id="2" name="Title 1"/>
+          <p:cNvSpPr>
+            <a:spLocks noGrp="1"/>
+          </p:cNvSpPr>
+          <p:nvPr>
+            <p:ph type="title"/>
+          </p:nvPr>
+        </p:nvSpPr>
+        <p:spPr>
+          <a:xfrm>
+            <a:off x="1028700" y="1967266"/>
+            <a:ext cx="2628900" cy="2547257"/>
+          </a:xfrm>
+          <a:noFill/>
+        </p:spPr>
+        <p:txBody>
+          <a:bodyPr vert="horz" lIns="91440" tIns="45720" rIns="91440" bIns="45720" rtlCol="0" anchor="ctr">
+            <a:normAutofit/>
+          </a:bodyPr>
+          <a:lstStyle/>
+          <a:p>
+            <a:pPr algn="ctr"/>
+            <a:r>
+              <a:rPr lang="en-US" sz="3600" kern="1200">
+                <a:solidFill>
+                  <a:schemeClr val="bg1"/>
+                </a:solidFill>
+                <a:latin typeface="+mj-lt"/>
+                <a:ea typeface="+mj-ea"/>
+                <a:cs typeface="+mj-cs"/>
+              </a:rPr>
+              <a:t>Use Case</a:t>
+            </a:r>
+          </a:p>
+        </p:txBody>
+      </p:sp>
+    </p:spTree>
+    <p:extLst>
+      <p:ext uri="{BB962C8B-B14F-4D97-AF65-F5344CB8AC3E}">
+        <p14:creationId xmlns:p14="http://schemas.microsoft.com/office/powerpoint/2010/main" val="3351990692"/>
+      </p:ext>
+    </p:extLst>
+  </p:cSld>
+  <p:clrMapOvr>
+    <a:masterClrMapping/>
+  </p:clrMapOvr>
+</p:sld>
+</file>
+
+<file path=ppt/slides/slide6.xml><?xml version="1.0" encoding="utf-8"?>
 <p:sld xmlns:a="http://schemas.openxmlformats.org/drawingml/2006/main" xmlns:r="http://schemas.openxmlformats.org/officeDocument/2006/relationships" xmlns:p="http://schemas.openxmlformats.org/presentationml/2006/main">
   <p:cSld>
     <p:spTree>
@@ -5970,100 +6290,6 @@
 </p:sld>
 </file>
 
-<file path=ppt/slides/slide6.xml><?xml version="1.0" encoding="utf-8"?>
-<p:sld xmlns:a="http://schemas.openxmlformats.org/drawingml/2006/main" xmlns:r="http://schemas.openxmlformats.org/officeDocument/2006/relationships" xmlns:p="http://schemas.openxmlformats.org/presentationml/2006/main">
-  <p:cSld>
-    <p:spTree>
-      <p:nvGrpSpPr>
-        <p:cNvPr id="1" name=""/>
-        <p:cNvGrpSpPr/>
-        <p:nvPr/>
-      </p:nvGrpSpPr>
-      <p:grpSpPr>
-        <a:xfrm>
-          <a:off x="0" y="0"/>
-          <a:ext cx="0" cy="0"/>
-          <a:chOff x="0" y="0"/>
-          <a:chExt cx="0" cy="0"/>
-        </a:xfrm>
-      </p:grpSpPr>
-      <p:sp>
-        <p:nvSpPr>
-          <p:cNvPr id="2" name="Title 1"/>
-          <p:cNvSpPr>
-            <a:spLocks noGrp="1"/>
-          </p:cNvSpPr>
-          <p:nvPr>
-            <p:ph type="title"/>
-          </p:nvPr>
-        </p:nvSpPr>
-        <p:spPr/>
-        <p:txBody>
-          <a:bodyPr/>
-          <a:lstStyle/>
-          <a:p>
-            <a:r>
-              <a:rPr lang="en-US" dirty="0"/>
-              <a:t>Data Filtering</a:t>
-            </a:r>
-          </a:p>
-        </p:txBody>
-      </p:sp>
-      <p:sp>
-        <p:nvSpPr>
-          <p:cNvPr id="3" name="Content Placeholder 2"/>
-          <p:cNvSpPr>
-            <a:spLocks noGrp="1"/>
-          </p:cNvSpPr>
-          <p:nvPr>
-            <p:ph idx="1"/>
-          </p:nvPr>
-        </p:nvSpPr>
-        <p:spPr/>
-        <p:txBody>
-          <a:bodyPr/>
-          <a:lstStyle/>
-          <a:p>
-            <a:r>
-              <a:rPr lang="en-US" dirty="0"/>
-              <a:t>Several approaches were implemented and tested</a:t>
-            </a:r>
-          </a:p>
-          <a:p>
-            <a:pPr lvl="1"/>
-            <a:r>
-              <a:rPr lang="en-US" dirty="0"/>
-              <a:t>Buffered averaging</a:t>
-            </a:r>
-          </a:p>
-          <a:p>
-            <a:pPr lvl="1"/>
-            <a:r>
-              <a:rPr lang="en-US" dirty="0"/>
-              <a:t>Linear interpolation</a:t>
-            </a:r>
-          </a:p>
-          <a:p>
-            <a:r>
-              <a:rPr lang="en-US" dirty="0"/>
-              <a:t>Smooth out erroneous data and make the graphics look nicer, while still maintaining meaningful data</a:t>
-            </a:r>
-          </a:p>
-        </p:txBody>
-      </p:sp>
-    </p:spTree>
-    <p:extLst>
-      <p:ext uri="{BB962C8B-B14F-4D97-AF65-F5344CB8AC3E}">
-        <p14:creationId xmlns:p14="http://schemas.microsoft.com/office/powerpoint/2010/main" val="4265326637"/>
-      </p:ext>
-    </p:extLst>
-  </p:cSld>
-  <p:clrMapOvr>
-    <a:masterClrMapping/>
-  </p:clrMapOvr>
-</p:sld>
-</file>
-
 <file path=ppt/slides/slide7.xml><?xml version="1.0" encoding="utf-8"?>
 <p:sld xmlns:a="http://schemas.openxmlformats.org/drawingml/2006/main" xmlns:r="http://schemas.openxmlformats.org/officeDocument/2006/relationships" xmlns:p="http://schemas.openxmlformats.org/presentationml/2006/main">
   <p:cSld>
@@ -6096,6 +6322,100 @@
           <a:bodyPr/>
           <a:lstStyle/>
           <a:p>
+            <a:r>
+              <a:rPr lang="en-US" dirty="0"/>
+              <a:t>Data Filtering</a:t>
+            </a:r>
+          </a:p>
+        </p:txBody>
+      </p:sp>
+      <p:sp>
+        <p:nvSpPr>
+          <p:cNvPr id="3" name="Content Placeholder 2"/>
+          <p:cNvSpPr>
+            <a:spLocks noGrp="1"/>
+          </p:cNvSpPr>
+          <p:nvPr>
+            <p:ph idx="1"/>
+          </p:nvPr>
+        </p:nvSpPr>
+        <p:spPr/>
+        <p:txBody>
+          <a:bodyPr/>
+          <a:lstStyle/>
+          <a:p>
+            <a:r>
+              <a:rPr lang="en-US" dirty="0"/>
+              <a:t>Several approaches were implemented and tested</a:t>
+            </a:r>
+          </a:p>
+          <a:p>
+            <a:pPr lvl="1"/>
+            <a:r>
+              <a:rPr lang="en-US" dirty="0"/>
+              <a:t>Buffered averaging</a:t>
+            </a:r>
+          </a:p>
+          <a:p>
+            <a:pPr lvl="1"/>
+            <a:r>
+              <a:rPr lang="en-US" dirty="0"/>
+              <a:t>Linear interpolation</a:t>
+            </a:r>
+          </a:p>
+          <a:p>
+            <a:r>
+              <a:rPr lang="en-US" dirty="0"/>
+              <a:t>Smooth out erroneous data and make the graphics look nicer, while still maintaining meaningful data</a:t>
+            </a:r>
+          </a:p>
+        </p:txBody>
+      </p:sp>
+    </p:spTree>
+    <p:extLst>
+      <p:ext uri="{BB962C8B-B14F-4D97-AF65-F5344CB8AC3E}">
+        <p14:creationId xmlns:p14="http://schemas.microsoft.com/office/powerpoint/2010/main" val="4265326637"/>
+      </p:ext>
+    </p:extLst>
+  </p:cSld>
+  <p:clrMapOvr>
+    <a:masterClrMapping/>
+  </p:clrMapOvr>
+</p:sld>
+</file>
+
+<file path=ppt/slides/slide8.xml><?xml version="1.0" encoding="utf-8"?>
+<p:sld xmlns:a="http://schemas.openxmlformats.org/drawingml/2006/main" xmlns:r="http://schemas.openxmlformats.org/officeDocument/2006/relationships" xmlns:p="http://schemas.openxmlformats.org/presentationml/2006/main">
+  <p:cSld>
+    <p:spTree>
+      <p:nvGrpSpPr>
+        <p:cNvPr id="1" name=""/>
+        <p:cNvGrpSpPr/>
+        <p:nvPr/>
+      </p:nvGrpSpPr>
+      <p:grpSpPr>
+        <a:xfrm>
+          <a:off x="0" y="0"/>
+          <a:ext cx="0" cy="0"/>
+          <a:chOff x="0" y="0"/>
+          <a:chExt cx="0" cy="0"/>
+        </a:xfrm>
+      </p:grpSpPr>
+      <p:sp>
+        <p:nvSpPr>
+          <p:cNvPr id="2" name="Title 1"/>
+          <p:cNvSpPr>
+            <a:spLocks noGrp="1"/>
+          </p:cNvSpPr>
+          <p:nvPr>
+            <p:ph type="title"/>
+          </p:nvPr>
+        </p:nvSpPr>
+        <p:spPr/>
+        <p:txBody>
+          <a:bodyPr/>
+          <a:lstStyle/>
+          <a:p>
             <a:pPr algn="ctr"/>
             <a:r>
               <a:rPr lang="en-US" dirty="0"/>
@@ -6136,7 +6456,7 @@
 </p:sld>
 </file>
 
-<file path=ppt/slides/slide8.xml><?xml version="1.0" encoding="utf-8"?>
+<file path=ppt/slides/slide9.xml><?xml version="1.0" encoding="utf-8"?>
 <p:sld xmlns:a="http://schemas.openxmlformats.org/drawingml/2006/main" xmlns:r="http://schemas.openxmlformats.org/officeDocument/2006/relationships" xmlns:p="http://schemas.openxmlformats.org/presentationml/2006/main">
   <p:cSld>
     <p:spTree>
@@ -6296,134 +6616,6 @@
     <p:extLst>
       <p:ext uri="{BB962C8B-B14F-4D97-AF65-F5344CB8AC3E}">
         <p14:creationId xmlns:p14="http://schemas.microsoft.com/office/powerpoint/2010/main" val="2702824088"/>
-      </p:ext>
-    </p:extLst>
-  </p:cSld>
-  <p:clrMapOvr>
-    <a:masterClrMapping/>
-  </p:clrMapOvr>
-</p:sld>
-</file>
-
-<file path=ppt/slides/slide9.xml><?xml version="1.0" encoding="utf-8"?>
-<p:sld xmlns:a="http://schemas.openxmlformats.org/drawingml/2006/main" xmlns:r="http://schemas.openxmlformats.org/officeDocument/2006/relationships" xmlns:p="http://schemas.openxmlformats.org/presentationml/2006/main">
-  <p:cSld>
-    <p:spTree>
-      <p:nvGrpSpPr>
-        <p:cNvPr id="1" name=""/>
-        <p:cNvGrpSpPr/>
-        <p:nvPr/>
-      </p:nvGrpSpPr>
-      <p:grpSpPr>
-        <a:xfrm>
-          <a:off x="0" y="0"/>
-          <a:ext cx="0" cy="0"/>
-          <a:chOff x="0" y="0"/>
-          <a:chExt cx="0" cy="0"/>
-        </a:xfrm>
-      </p:grpSpPr>
-      <p:sp>
-        <p:nvSpPr>
-          <p:cNvPr id="2" name="Title 1"/>
-          <p:cNvSpPr>
-            <a:spLocks noGrp="1"/>
-          </p:cNvSpPr>
-          <p:nvPr>
-            <p:ph type="title"/>
-          </p:nvPr>
-        </p:nvSpPr>
-        <p:spPr/>
-        <p:txBody>
-          <a:bodyPr/>
-          <a:lstStyle/>
-          <a:p>
-            <a:pPr algn="ctr"/>
-            <a:r>
-              <a:rPr lang="en-US" dirty="0"/>
-              <a:t>Linear Interpolation of Data Points</a:t>
-            </a:r>
-          </a:p>
-        </p:txBody>
-      </p:sp>
-      <p:sp>
-        <p:nvSpPr>
-          <p:cNvPr id="3" name="Content Placeholder 2"/>
-          <p:cNvSpPr>
-            <a:spLocks noGrp="1"/>
-          </p:cNvSpPr>
-          <p:nvPr>
-            <p:ph idx="1"/>
-          </p:nvPr>
-        </p:nvSpPr>
-        <p:spPr/>
-        <p:txBody>
-          <a:bodyPr/>
-          <a:lstStyle/>
-          <a:p>
-            <a:r>
-              <a:rPr lang="en-US" dirty="0"/>
-              <a:t>Solid colors are nice, but lack detail.</a:t>
-            </a:r>
-          </a:p>
-          <a:p>
-            <a:pPr lvl="1"/>
-            <a:r>
-              <a:rPr lang="en-US" dirty="0"/>
-              <a:t>What is the temperature between the different points?</a:t>
-            </a:r>
-          </a:p>
-          <a:p>
-            <a:r>
-              <a:rPr lang="en-US" dirty="0"/>
-              <a:t>Solution: Interpolate data points between the measured locations.</a:t>
-            </a:r>
-          </a:p>
-          <a:p>
-            <a:pPr lvl="1"/>
-            <a:r>
-              <a:rPr lang="en-US" dirty="0"/>
-              <a:t>Linear interpolation.</a:t>
-            </a:r>
-          </a:p>
-          <a:p>
-            <a:pPr lvl="2"/>
-            <a:r>
-              <a:rPr lang="en-US" dirty="0"/>
-              <a:t>Y = </a:t>
-            </a:r>
-            <a:r>
-              <a:rPr lang="en-US" dirty="0" err="1"/>
-              <a:t>mX</a:t>
-            </a:r>
-            <a:r>
-              <a:rPr lang="en-US" dirty="0"/>
-              <a:t> + b	where	m = (y1 – y2)/(x1 – x2)</a:t>
-            </a:r>
-          </a:p>
-          <a:p>
-            <a:pPr lvl="1"/>
-            <a:r>
-              <a:rPr lang="en-US" dirty="0"/>
-              <a:t>Quadradic interpolation</a:t>
-            </a:r>
-          </a:p>
-          <a:p>
-            <a:pPr lvl="2"/>
-            <a:r>
-              <a:rPr lang="en-US" dirty="0"/>
-              <a:t>Y = a(x-h)^2 + c		where ‘h’ is the x offset and ‘a’ scales the rate</a:t>
-            </a:r>
-          </a:p>
-          <a:p>
-            <a:pPr lvl="2"/>
-            <a:endParaRPr lang="en-US" dirty="0"/>
-          </a:p>
-        </p:txBody>
-      </p:sp>
-    </p:spTree>
-    <p:extLst>
-      <p:ext uri="{BB962C8B-B14F-4D97-AF65-F5344CB8AC3E}">
-        <p14:creationId xmlns:p14="http://schemas.microsoft.com/office/powerpoint/2010/main" val="2810286071"/>
       </p:ext>
     </p:extLst>
   </p:cSld>

</xml_diff>